<commit_message>
Added Week 3 Day 1 materials
</commit_message>
<xml_diff>
--- a/Training Materials/Week 2/Day 5/1. Behavior-driven Development and Cucumber/Slides/4. Your First Cucumber JVM Project/your-first-cucumber-jvm-project-slides.pptx
+++ b/Training Materials/Week 2/Day 5/1. Behavior-driven Development and Cucumber/Slides/4. Your First Cucumber JVM Project/your-first-cucumber-jvm-project-slides.pptx
@@ -6148,7 +6148,7 @@
           </a:bodyPr>
           <a:lstStyle/>
           <a:p>
-            <a:pPr marR="4273550" algn="r">
+            <a:pPr marR="4273550" algn="l">
               <a:lnSpc>
                 <a:spcPct val="100000"/>
               </a:lnSpc>
@@ -6172,7 +6172,7 @@
             </a:endParaRPr>
           </a:p>
           <a:p>
-            <a:pPr marR="4273550" algn="r">
+            <a:pPr marR="4273550" algn="l">
               <a:lnSpc>
                 <a:spcPct val="100000"/>
               </a:lnSpc>

</xml_diff>